<commit_message>
small changes to lecture 25
</commit_message>
<xml_diff>
--- a/classes/prog2022/Prog3-Lecture25.pptx
+++ b/classes/prog2022/Prog3-Lecture25.pptx
@@ -221,7 +221,7 @@
           <a:p>
             <a:fld id="{3BABB8C3-AB64-4198-A259-5325705B1586}" type="datetimeFigureOut">
               <a:rPr lang="en-US" smtClean="0"/>
-              <a:t>11/27/2022</a:t>
+              <a:t>11/30/2022</a:t>
             </a:fld>
             <a:endParaRPr lang="en-US"/>
           </a:p>
@@ -974,7 +974,7 @@
           <a:p>
             <a:fld id="{32FFEE7D-2242-46A4-9E7F-1E413A012AD3}" type="datetimeFigureOut">
               <a:rPr lang="en-US" smtClean="0"/>
-              <a:t>11/27/2022</a:t>
+              <a:t>11/30/2022</a:t>
             </a:fld>
             <a:endParaRPr lang="en-US"/>
           </a:p>
@@ -1172,7 +1172,7 @@
           <a:p>
             <a:fld id="{32FFEE7D-2242-46A4-9E7F-1E413A012AD3}" type="datetimeFigureOut">
               <a:rPr lang="en-US" smtClean="0"/>
-              <a:t>11/27/2022</a:t>
+              <a:t>11/30/2022</a:t>
             </a:fld>
             <a:endParaRPr lang="en-US"/>
           </a:p>
@@ -1380,7 +1380,7 @@
           <a:p>
             <a:fld id="{32FFEE7D-2242-46A4-9E7F-1E413A012AD3}" type="datetimeFigureOut">
               <a:rPr lang="en-US" smtClean="0"/>
-              <a:t>11/27/2022</a:t>
+              <a:t>11/30/2022</a:t>
             </a:fld>
             <a:endParaRPr lang="en-US"/>
           </a:p>
@@ -1578,7 +1578,7 @@
           <a:p>
             <a:fld id="{32FFEE7D-2242-46A4-9E7F-1E413A012AD3}" type="datetimeFigureOut">
               <a:rPr lang="en-US" smtClean="0"/>
-              <a:t>11/27/2022</a:t>
+              <a:t>11/30/2022</a:t>
             </a:fld>
             <a:endParaRPr lang="en-US"/>
           </a:p>
@@ -1853,7 +1853,7 @@
           <a:p>
             <a:fld id="{32FFEE7D-2242-46A4-9E7F-1E413A012AD3}" type="datetimeFigureOut">
               <a:rPr lang="en-US" smtClean="0"/>
-              <a:t>11/27/2022</a:t>
+              <a:t>11/30/2022</a:t>
             </a:fld>
             <a:endParaRPr lang="en-US"/>
           </a:p>
@@ -2118,7 +2118,7 @@
           <a:p>
             <a:fld id="{32FFEE7D-2242-46A4-9E7F-1E413A012AD3}" type="datetimeFigureOut">
               <a:rPr lang="en-US" smtClean="0"/>
-              <a:t>11/27/2022</a:t>
+              <a:t>11/30/2022</a:t>
             </a:fld>
             <a:endParaRPr lang="en-US"/>
           </a:p>
@@ -2530,7 +2530,7 @@
           <a:p>
             <a:fld id="{32FFEE7D-2242-46A4-9E7F-1E413A012AD3}" type="datetimeFigureOut">
               <a:rPr lang="en-US" smtClean="0"/>
-              <a:t>11/27/2022</a:t>
+              <a:t>11/30/2022</a:t>
             </a:fld>
             <a:endParaRPr lang="en-US"/>
           </a:p>
@@ -2671,7 +2671,7 @@
           <a:p>
             <a:fld id="{32FFEE7D-2242-46A4-9E7F-1E413A012AD3}" type="datetimeFigureOut">
               <a:rPr lang="en-US" smtClean="0"/>
-              <a:t>11/27/2022</a:t>
+              <a:t>11/30/2022</a:t>
             </a:fld>
             <a:endParaRPr lang="en-US"/>
           </a:p>
@@ -2784,7 +2784,7 @@
           <a:p>
             <a:fld id="{32FFEE7D-2242-46A4-9E7F-1E413A012AD3}" type="datetimeFigureOut">
               <a:rPr lang="en-US" smtClean="0"/>
-              <a:t>11/27/2022</a:t>
+              <a:t>11/30/2022</a:t>
             </a:fld>
             <a:endParaRPr lang="en-US"/>
           </a:p>
@@ -3095,7 +3095,7 @@
           <a:p>
             <a:fld id="{32FFEE7D-2242-46A4-9E7F-1E413A012AD3}" type="datetimeFigureOut">
               <a:rPr lang="en-US" smtClean="0"/>
-              <a:t>11/27/2022</a:t>
+              <a:t>11/30/2022</a:t>
             </a:fld>
             <a:endParaRPr lang="en-US"/>
           </a:p>
@@ -3383,7 +3383,7 @@
           <a:p>
             <a:fld id="{32FFEE7D-2242-46A4-9E7F-1E413A012AD3}" type="datetimeFigureOut">
               <a:rPr lang="en-US" smtClean="0"/>
-              <a:t>11/27/2022</a:t>
+              <a:t>11/30/2022</a:t>
             </a:fld>
             <a:endParaRPr lang="en-US"/>
           </a:p>
@@ -3624,7 +3624,7 @@
           <a:p>
             <a:fld id="{32FFEE7D-2242-46A4-9E7F-1E413A012AD3}" type="datetimeFigureOut">
               <a:rPr lang="en-US" smtClean="0"/>
-              <a:t>11/27/2022</a:t>
+              <a:t>11/30/2022</a:t>
             </a:fld>
             <a:endParaRPr lang="en-US"/>
           </a:p>
@@ -4563,7 +4563,7 @@
         <p:spPr>
           <a:xfrm>
             <a:off x="650240" y="71120"/>
-            <a:ext cx="7617855" cy="369332"/>
+            <a:ext cx="8919686" cy="369332"/>
           </a:xfrm>
           <a:prstGeom prst="rect">
             <a:avLst/>
@@ -4578,15 +4578,7 @@
           <a:p>
             <a:r>
               <a:rPr lang="en-US" dirty="0"/>
-              <a:t>Using </a:t>
-            </a:r>
-            <a:r>
-              <a:rPr lang="en-US" dirty="0" err="1"/>
-              <a:t>var</a:t>
-            </a:r>
-            <a:r>
-              <a:rPr lang="en-US" dirty="0"/>
-              <a:t> you kind of have to tie yourself in knots to find an appropriate scope…</a:t>
+              <a:t>Using var you kind of have to tie yourself in knots to find an appropriate scope via the closure</a:t>
             </a:r>
           </a:p>
         </p:txBody>
@@ -7812,7 +7804,7 @@
         <p:spPr>
           <a:xfrm>
             <a:off x="9268691" y="1292629"/>
-            <a:ext cx="2810256" cy="369332"/>
+            <a:ext cx="2884123" cy="923330"/>
           </a:xfrm>
           <a:prstGeom prst="rect">
             <a:avLst/>
@@ -7828,6 +7820,18 @@
             <a:r>
               <a:rPr lang="en-US" dirty="0"/>
               <a:t>Here a is in the global scope</a:t>
+            </a:r>
+          </a:p>
+          <a:p>
+            <a:r>
+              <a:rPr lang="en-US" dirty="0"/>
+              <a:t>b is not visible outside of the</a:t>
+            </a:r>
+          </a:p>
+          <a:p>
+            <a:r>
+              <a:rPr lang="en-US" dirty="0"/>
+              <a:t>block (more like Java)</a:t>
             </a:r>
           </a:p>
         </p:txBody>
@@ -8012,6 +8016,62 @@
             <a:r>
               <a:rPr lang="en-US" dirty="0"/>
               <a:t>(and the way closures interact with for loops)</a:t>
+            </a:r>
+          </a:p>
+        </p:txBody>
+      </p:sp>
+      <p:sp>
+        <p:nvSpPr>
+          <p:cNvPr id="2" name="TextBox 1">
+            <a:extLst>
+              <a:ext uri="{FF2B5EF4-FFF2-40B4-BE49-F238E27FC236}">
+                <a16:creationId xmlns:a16="http://schemas.microsoft.com/office/drawing/2014/main" id="{C8F99A60-171E-2D13-7A65-CEA9965A0F53}"/>
+              </a:ext>
+            </a:extLst>
+          </p:cNvPr>
+          <p:cNvSpPr txBox="1"/>
+          <p:nvPr/>
+        </p:nvSpPr>
+        <p:spPr>
+          <a:xfrm>
+            <a:off x="6517178" y="4172989"/>
+            <a:ext cx="5442516" cy="923330"/>
+          </a:xfrm>
+          <a:prstGeom prst="rect">
+            <a:avLst/>
+          </a:prstGeom>
+          <a:noFill/>
+        </p:spPr>
+        <p:txBody>
+          <a:bodyPr wrap="none" rtlCol="0">
+            <a:spAutoFit/>
+          </a:bodyPr>
+          <a:lstStyle/>
+          <a:p>
+            <a:r>
+              <a:rPr lang="en-US" dirty="0">
+                <a:latin typeface="Arial" panose="020B0604020202020204" pitchFamily="34" charset="0"/>
+                <a:cs typeface="Arial" panose="020B0604020202020204" pitchFamily="34" charset="0"/>
+              </a:rPr>
+              <a:t>This is very counter-intuitive for a Java programmer</a:t>
+            </a:r>
+          </a:p>
+          <a:p>
+            <a:r>
+              <a:rPr lang="en-US" dirty="0">
+                <a:latin typeface="Arial" panose="020B0604020202020204" pitchFamily="34" charset="0"/>
+                <a:cs typeface="Arial" panose="020B0604020202020204" pitchFamily="34" charset="0"/>
+              </a:rPr>
+              <a:t>x in the inner scope is a different variable than </a:t>
+            </a:r>
+          </a:p>
+          <a:p>
+            <a:r>
+              <a:rPr lang="en-US" dirty="0">
+                <a:latin typeface="Arial" panose="020B0604020202020204" pitchFamily="34" charset="0"/>
+                <a:cs typeface="Arial" panose="020B0604020202020204" pitchFamily="34" charset="0"/>
+              </a:rPr>
+              <a:t>x in the outer scope. </a:t>
             </a:r>
           </a:p>
         </p:txBody>

</xml_diff>